<commit_message>
combine percolation plots real multiplex network example
</commit_message>
<xml_diff>
--- a/pics.pptx
+++ b/pics.pptx
@@ -6,10 +6,10 @@
     <p:sldMasterId id="2147483684" r:id="rId2"/>
   </p:sldMasterIdLst>
   <p:notesMasterIdLst>
-    <p:notesMasterId r:id="rId10"/>
+    <p:notesMasterId r:id="rId11"/>
   </p:notesMasterIdLst>
   <p:handoutMasterIdLst>
-    <p:handoutMasterId r:id="rId11"/>
+    <p:handoutMasterId r:id="rId12"/>
   </p:handoutMasterIdLst>
   <p:sldIdLst>
     <p:sldId id="335" r:id="rId3"/>
@@ -17,8 +17,9 @@
     <p:sldId id="339" r:id="rId5"/>
     <p:sldId id="337" r:id="rId6"/>
     <p:sldId id="336" r:id="rId7"/>
-    <p:sldId id="333" r:id="rId8"/>
-    <p:sldId id="334" r:id="rId9"/>
+    <p:sldId id="340" r:id="rId8"/>
+    <p:sldId id="333" r:id="rId9"/>
+    <p:sldId id="334" r:id="rId10"/>
   </p:sldIdLst>
   <p:sldSz cx="12192000" cy="6858000"/>
   <p:notesSz cx="6858000" cy="9144000"/>
@@ -254,7 +255,7 @@
   <p:extLst>
     <p:ext uri="{521415D9-36F7-43E2-AB2F-B90AF26B5E84}">
       <p14:sectionLst xmlns:p14="http://schemas.microsoft.com/office/powerpoint/2010/main">
-        <p14:section name="Pictures" id="{3241AC90-F98D-4BD2-B9ED-0118922F1EED}">
+        <p14:section name="Schematic" id="{3241AC90-F98D-4BD2-B9ED-0118922F1EED}">
           <p14:sldIdLst>
             <p14:sldId id="335"/>
             <p14:sldId id="338"/>
@@ -262,6 +263,14 @@
             <p14:sldId id="337"/>
             <p14:sldId id="336"/>
           </p14:sldIdLst>
+        </p14:section>
+        <p14:section name="Percolation" id="{464BA7EB-AA98-44C5-A08A-5212052DAC43}">
+          <p14:sldIdLst>
+            <p14:sldId id="340"/>
+          </p14:sldIdLst>
+        </p14:section>
+        <p14:section name="Layers comparison" id="{B4FB8516-7626-464E-B70B-78CEA70FE127}">
+          <p14:sldIdLst/>
         </p14:section>
         <p14:section name="Review comments" id="{EFE9B34B-4519-4A31-81DC-22E405D018C7}">
           <p14:sldIdLst>
@@ -374,7 +383,7 @@
           <a:p>
             <a:fld id="{F0723C67-A537-4015-B65B-23BD5E60E715}" type="datetimeFigureOut">
               <a:rPr lang="en-US" smtClean="0"/>
-              <a:t>9/21/2023</a:t>
+              <a:t>1/15/2024</a:t>
             </a:fld>
             <a:endParaRPr lang="en-US"/>
           </a:p>
@@ -18895,8 +18904,8 @@
           </a:fontRef>
         </p:style>
       </p:cxnSp>
-      <mc:AlternateContent xmlns:mc="http://schemas.openxmlformats.org/markup-compatibility/2006">
-        <mc:Choice xmlns:a14="http://schemas.microsoft.com/office/drawing/2010/main" Requires="a14">
+      <mc:AlternateContent xmlns:mc="http://schemas.openxmlformats.org/markup-compatibility/2006" xmlns:a14="http://schemas.microsoft.com/office/drawing/2010/main">
+        <mc:Choice Requires="a14">
           <p:sp>
             <p:nvSpPr>
               <p:cNvPr id="3" name="TextBox 2">
@@ -18946,7 +18955,7 @@
             </p:txBody>
           </p:sp>
         </mc:Choice>
-        <mc:Fallback>
+        <mc:Fallback xmlns="">
           <p:sp>
             <p:nvSpPr>
               <p:cNvPr id="3" name="TextBox 2">
@@ -18991,8 +19000,8 @@
           </p:sp>
         </mc:Fallback>
       </mc:AlternateContent>
-      <mc:AlternateContent xmlns:mc="http://schemas.openxmlformats.org/markup-compatibility/2006">
-        <mc:Choice xmlns:a14="http://schemas.microsoft.com/office/drawing/2010/main" Requires="a14">
+      <mc:AlternateContent xmlns:mc="http://schemas.openxmlformats.org/markup-compatibility/2006" xmlns:a14="http://schemas.microsoft.com/office/drawing/2010/main">
+        <mc:Choice Requires="a14">
           <p:sp>
             <p:nvSpPr>
               <p:cNvPr id="5" name="TextBox 4">
@@ -19042,7 +19051,7 @@
             </p:txBody>
           </p:sp>
         </mc:Choice>
-        <mc:Fallback>
+        <mc:Fallback xmlns="">
           <p:sp>
             <p:nvSpPr>
               <p:cNvPr id="5" name="TextBox 4">
@@ -22789,6 +22798,111 @@
 </file>
 
 <file path=ppt/slides/slide6.xml><?xml version="1.0" encoding="utf-8"?>
+<p:sld xmlns:a="http://schemas.openxmlformats.org/drawingml/2006/main" xmlns:r="http://schemas.openxmlformats.org/officeDocument/2006/relationships" xmlns:p="http://schemas.openxmlformats.org/presentationml/2006/main">
+  <p:cSld>
+    <p:spTree>
+      <p:nvGrpSpPr>
+        <p:cNvPr id="1" name=""/>
+        <p:cNvGrpSpPr/>
+        <p:nvPr/>
+      </p:nvGrpSpPr>
+      <p:grpSpPr>
+        <a:xfrm>
+          <a:off x="0" y="0"/>
+          <a:ext cx="0" cy="0"/>
+          <a:chOff x="0" y="0"/>
+          <a:chExt cx="0" cy="0"/>
+        </a:xfrm>
+      </p:grpSpPr>
+      <p:graphicFrame>
+        <p:nvGraphicFramePr>
+          <p:cNvPr id="7" name="Object 6">
+            <a:extLst>
+              <a:ext uri="{FF2B5EF4-FFF2-40B4-BE49-F238E27FC236}">
+                <a16:creationId xmlns:a16="http://schemas.microsoft.com/office/drawing/2014/main" id="{A9659326-6AE2-A476-9486-231DA4C652F5}"/>
+              </a:ext>
+            </a:extLst>
+          </p:cNvPr>
+          <p:cNvGraphicFramePr>
+            <a:graphicFrameLocks noChangeAspect="1"/>
+          </p:cNvGraphicFramePr>
+          <p:nvPr>
+            <p:extLst>
+              <p:ext uri="{D42A27DB-BD31-4B8C-83A1-F6EECF244321}">
+                <p14:modId xmlns:p14="http://schemas.microsoft.com/office/powerpoint/2010/main" val="2270031504"/>
+              </p:ext>
+            </p:extLst>
+          </p:nvPr>
+        </p:nvGraphicFramePr>
+        <p:xfrm>
+          <a:off x="5683250" y="3208338"/>
+          <a:ext cx="825500" cy="438150"/>
+        </p:xfrm>
+        <a:graphic>
+          <a:graphicData uri="http://schemas.openxmlformats.org/presentationml/2006/ole">
+            <mc:AlternateContent xmlns:mc="http://schemas.openxmlformats.org/markup-compatibility/2006">
+              <mc:Choice xmlns:v="urn:schemas-microsoft-com:vml" Requires="v">
+                <p:oleObj name="Packager Shell Object" showAsIcon="1" r:id="rId2" imgW="825480" imgH="437400" progId="Package">
+                  <p:embed/>
+                </p:oleObj>
+              </mc:Choice>
+              <mc:Fallback>
+                <p:oleObj name="Packager Shell Object" showAsIcon="1" r:id="rId2" imgW="825480" imgH="437400" progId="Package">
+                  <p:embed/>
+                  <p:pic>
+                    <p:nvPicPr>
+                      <p:cNvPr id="0" name=""/>
+                      <p:cNvPicPr/>
+                      <p:nvPr/>
+                    </p:nvPicPr>
+                    <p:blipFill>
+                      <a:blip r:embed="rId3"/>
+                      <a:stretch>
+                        <a:fillRect/>
+                      </a:stretch>
+                    </p:blipFill>
+                    <p:spPr>
+                      <a:xfrm>
+                        <a:off x="5683250" y="3208338"/>
+                        <a:ext cx="825500" cy="438150"/>
+                      </a:xfrm>
+                      <a:prstGeom prst="rect">
+                        <a:avLst/>
+                      </a:prstGeom>
+                    </p:spPr>
+                  </p:pic>
+                </p:oleObj>
+              </mc:Fallback>
+            </mc:AlternateContent>
+          </a:graphicData>
+        </a:graphic>
+      </p:graphicFrame>
+    </p:spTree>
+    <p:extLst>
+      <p:ext uri="{BB962C8B-B14F-4D97-AF65-F5344CB8AC3E}">
+        <p14:creationId xmlns:p14="http://schemas.microsoft.com/office/powerpoint/2010/main" val="2547555051"/>
+      </p:ext>
+    </p:extLst>
+  </p:cSld>
+  <p:clrMapOvr>
+    <a:masterClrMapping/>
+  </p:clrMapOvr>
+  <mc:AlternateContent xmlns:mc="http://schemas.openxmlformats.org/markup-compatibility/2006" xmlns:p159="http://schemas.microsoft.com/office/powerpoint/2015/09/main">
+    <mc:Choice Requires="p159">
+      <p:transition spd="slow">
+        <p159:morph option="byWord"/>
+      </p:transition>
+    </mc:Choice>
+    <mc:Fallback xmlns="">
+      <p:transition spd="slow">
+        <p:fade/>
+      </p:transition>
+    </mc:Fallback>
+  </mc:AlternateContent>
+</p:sld>
+</file>
+
+<file path=ppt/slides/slide7.xml><?xml version="1.0" encoding="utf-8"?>
 <p:sld xmlns:a="http://schemas.openxmlformats.org/drawingml/2006/main" xmlns:r="http://schemas.openxmlformats.org/officeDocument/2006/relationships" xmlns:p="http://schemas.openxmlformats.org/presentationml/2006/main" showMasterSp="0">
   <p:cSld>
     <p:spTree>
@@ -22949,7 +23063,7 @@
 </p:sld>
 </file>
 
-<file path=ppt/slides/slide7.xml><?xml version="1.0" encoding="utf-8"?>
+<file path=ppt/slides/slide8.xml><?xml version="1.0" encoding="utf-8"?>
 <p:sld xmlns:a="http://schemas.openxmlformats.org/drawingml/2006/main" xmlns:r="http://schemas.openxmlformats.org/officeDocument/2006/relationships" xmlns:p="http://schemas.openxmlformats.org/presentationml/2006/main" showMasterSp="0">
   <p:cSld>
     <p:spTree>

</xml_diff>